<commit_message>
final edits before submission
</commit_message>
<xml_diff>
--- a/figures/chap1/Chapter 1 figures.pptx
+++ b/figures/chap1/Chapter 1 figures.pptx
@@ -113,6 +113,18 @@
 </p:presentation>
 </file>
 
+<file path=ppt/commentAuthors.xml><?xml version="1.0" encoding="utf-8"?>
+<p:cmAuthorLst xmlns:a="http://schemas.openxmlformats.org/drawingml/2006/main" xmlns:r="http://schemas.openxmlformats.org/officeDocument/2006/relationships" xmlns:p="http://schemas.openxmlformats.org/presentationml/2006/main">
+  <p:cmAuthor id="1" name="Smith, Gregory J." initials="SGJ" lastIdx="1" clrIdx="0">
+    <p:extLst>
+      <p:ext uri="{19B8F6BF-5375-455C-9EA6-DF929625EA0E}">
+        <p15:presenceInfo xmlns:p15="http://schemas.microsoft.com/office/powerpoint/2012/main" userId="Smith, Gregory J." providerId="None"/>
+      </p:ext>
+    </p:extLst>
+  </p:cmAuthor>
+</p:cmAuthorLst>
+</file>
+
 <file path=ppt/slideLayouts/slideLayout1.xml><?xml version="1.0" encoding="utf-8"?>
 <p:sldLayout xmlns:a="http://schemas.openxmlformats.org/drawingml/2006/main" xmlns:r="http://schemas.openxmlformats.org/officeDocument/2006/relationships" xmlns:p="http://schemas.openxmlformats.org/presentationml/2006/main" type="title" preserve="1">
   <p:cSld name="Title Slide">
@@ -260,7 +272,7 @@
           <a:p>
             <a:fld id="{6F6B00CA-3BD0-4DD6-AA34-DA0B5867D783}" type="datetimeFigureOut">
               <a:rPr lang="en-US" smtClean="0"/>
-              <a:t>11/7/2020</a:t>
+              <a:t>11/17/2020</a:t>
             </a:fld>
             <a:endParaRPr lang="en-US"/>
           </a:p>
@@ -458,7 +470,7 @@
           <a:p>
             <a:fld id="{6F6B00CA-3BD0-4DD6-AA34-DA0B5867D783}" type="datetimeFigureOut">
               <a:rPr lang="en-US" smtClean="0"/>
-              <a:t>11/7/2020</a:t>
+              <a:t>11/17/2020</a:t>
             </a:fld>
             <a:endParaRPr lang="en-US"/>
           </a:p>
@@ -666,7 +678,7 @@
           <a:p>
             <a:fld id="{6F6B00CA-3BD0-4DD6-AA34-DA0B5867D783}" type="datetimeFigureOut">
               <a:rPr lang="en-US" smtClean="0"/>
-              <a:t>11/7/2020</a:t>
+              <a:t>11/17/2020</a:t>
             </a:fld>
             <a:endParaRPr lang="en-US"/>
           </a:p>
@@ -864,7 +876,7 @@
           <a:p>
             <a:fld id="{6F6B00CA-3BD0-4DD6-AA34-DA0B5867D783}" type="datetimeFigureOut">
               <a:rPr lang="en-US" smtClean="0"/>
-              <a:t>11/7/2020</a:t>
+              <a:t>11/17/2020</a:t>
             </a:fld>
             <a:endParaRPr lang="en-US"/>
           </a:p>
@@ -1139,7 +1151,7 @@
           <a:p>
             <a:fld id="{6F6B00CA-3BD0-4DD6-AA34-DA0B5867D783}" type="datetimeFigureOut">
               <a:rPr lang="en-US" smtClean="0"/>
-              <a:t>11/7/2020</a:t>
+              <a:t>11/17/2020</a:t>
             </a:fld>
             <a:endParaRPr lang="en-US"/>
           </a:p>
@@ -1404,7 +1416,7 @@
           <a:p>
             <a:fld id="{6F6B00CA-3BD0-4DD6-AA34-DA0B5867D783}" type="datetimeFigureOut">
               <a:rPr lang="en-US" smtClean="0"/>
-              <a:t>11/7/2020</a:t>
+              <a:t>11/17/2020</a:t>
             </a:fld>
             <a:endParaRPr lang="en-US"/>
           </a:p>
@@ -1816,7 +1828,7 @@
           <a:p>
             <a:fld id="{6F6B00CA-3BD0-4DD6-AA34-DA0B5867D783}" type="datetimeFigureOut">
               <a:rPr lang="en-US" smtClean="0"/>
-              <a:t>11/7/2020</a:t>
+              <a:t>11/17/2020</a:t>
             </a:fld>
             <a:endParaRPr lang="en-US"/>
           </a:p>
@@ -1957,7 +1969,7 @@
           <a:p>
             <a:fld id="{6F6B00CA-3BD0-4DD6-AA34-DA0B5867D783}" type="datetimeFigureOut">
               <a:rPr lang="en-US" smtClean="0"/>
-              <a:t>11/7/2020</a:t>
+              <a:t>11/17/2020</a:t>
             </a:fld>
             <a:endParaRPr lang="en-US"/>
           </a:p>
@@ -2070,7 +2082,7 @@
           <a:p>
             <a:fld id="{6F6B00CA-3BD0-4DD6-AA34-DA0B5867D783}" type="datetimeFigureOut">
               <a:rPr lang="en-US" smtClean="0"/>
-              <a:t>11/7/2020</a:t>
+              <a:t>11/17/2020</a:t>
             </a:fld>
             <a:endParaRPr lang="en-US"/>
           </a:p>
@@ -2381,7 +2393,7 @@
           <a:p>
             <a:fld id="{6F6B00CA-3BD0-4DD6-AA34-DA0B5867D783}" type="datetimeFigureOut">
               <a:rPr lang="en-US" smtClean="0"/>
-              <a:t>11/7/2020</a:t>
+              <a:t>11/17/2020</a:t>
             </a:fld>
             <a:endParaRPr lang="en-US"/>
           </a:p>
@@ -2669,7 +2681,7 @@
           <a:p>
             <a:fld id="{6F6B00CA-3BD0-4DD6-AA34-DA0B5867D783}" type="datetimeFigureOut">
               <a:rPr lang="en-US" smtClean="0"/>
-              <a:t>11/7/2020</a:t>
+              <a:t>11/17/2020</a:t>
             </a:fld>
             <a:endParaRPr lang="en-US"/>
           </a:p>
@@ -2910,7 +2922,7 @@
           <a:p>
             <a:fld id="{6F6B00CA-3BD0-4DD6-AA34-DA0B5867D783}" type="datetimeFigureOut">
               <a:rPr lang="en-US" smtClean="0"/>
-              <a:t>11/7/2020</a:t>
+              <a:t>11/17/2020</a:t>
             </a:fld>
             <a:endParaRPr lang="en-US"/>
           </a:p>
@@ -3514,48 +3526,6 @@
           </a:p>
         </p:txBody>
       </p:sp>
-      <p:cxnSp>
-        <p:nvCxnSpPr>
-          <p:cNvPr id="18" name="Straight Arrow Connector 17">
-            <a:extLst>
-              <a:ext uri="{FF2B5EF4-FFF2-40B4-BE49-F238E27FC236}">
-                <a16:creationId xmlns:a16="http://schemas.microsoft.com/office/drawing/2014/main" id="{281FEB61-1AE7-4966-863E-E3CBFA6728D8}"/>
-              </a:ext>
-            </a:extLst>
-          </p:cNvPr>
-          <p:cNvCxnSpPr/>
-          <p:nvPr/>
-        </p:nvCxnSpPr>
-        <p:spPr>
-          <a:xfrm flipV="1">
-            <a:off x="6744231" y="2319949"/>
-            <a:ext cx="0" cy="457200"/>
-          </a:xfrm>
-          <a:prstGeom prst="straightConnector1">
-            <a:avLst/>
-          </a:prstGeom>
-          <a:ln w="38100">
-            <a:solidFill>
-              <a:srgbClr val="008000"/>
-            </a:solidFill>
-            <a:tailEnd type="triangle"/>
-          </a:ln>
-        </p:spPr>
-        <p:style>
-          <a:lnRef idx="1">
-            <a:schemeClr val="accent1"/>
-          </a:lnRef>
-          <a:fillRef idx="0">
-            <a:schemeClr val="accent1"/>
-          </a:fillRef>
-          <a:effectRef idx="0">
-            <a:schemeClr val="accent1"/>
-          </a:effectRef>
-          <a:fontRef idx="minor">
-            <a:schemeClr val="tx1"/>
-          </a:fontRef>
-        </p:style>
-      </p:cxnSp>
       <p:sp>
         <p:nvSpPr>
           <p:cNvPr id="21" name="Oval 20">
@@ -4733,45 +4703,6 @@
           <a:p>
             <a:pPr algn="ctr"/>
             <a:endParaRPr lang="en-US"/>
-          </a:p>
-        </p:txBody>
-      </p:sp>
-      <p:sp>
-        <p:nvSpPr>
-          <p:cNvPr id="71" name="TextBox 70">
-            <a:extLst>
-              <a:ext uri="{FF2B5EF4-FFF2-40B4-BE49-F238E27FC236}">
-                <a16:creationId xmlns:a16="http://schemas.microsoft.com/office/drawing/2014/main" id="{CA3E1B44-C218-4E4D-B988-B90E9532AC86}"/>
-              </a:ext>
-            </a:extLst>
-          </p:cNvPr>
-          <p:cNvSpPr txBox="1"/>
-          <p:nvPr/>
-        </p:nvSpPr>
-        <p:spPr>
-          <a:xfrm>
-            <a:off x="6804469" y="2398077"/>
-            <a:ext cx="375424" cy="369332"/>
-          </a:xfrm>
-          <a:prstGeom prst="rect">
-            <a:avLst/>
-          </a:prstGeom>
-          <a:noFill/>
-        </p:spPr>
-        <p:txBody>
-          <a:bodyPr wrap="none" rtlCol="0">
-            <a:spAutoFit/>
-          </a:bodyPr>
-          <a:lstStyle/>
-          <a:p>
-            <a:r>
-              <a:rPr lang="en-US" b="1" dirty="0">
-                <a:solidFill>
-                  <a:srgbClr val="008000"/>
-                </a:solidFill>
-              </a:rPr>
-              <a:t>IR</a:t>
-            </a:r>
           </a:p>
         </p:txBody>
       </p:sp>
@@ -5002,7 +4933,7 @@
         </p:nvSpPr>
         <p:spPr>
           <a:xfrm>
-            <a:off x="4984024" y="3854910"/>
+            <a:off x="4984024" y="3896855"/>
             <a:ext cx="597728" cy="369332"/>
           </a:xfrm>
           <a:prstGeom prst="rect">
@@ -5037,7 +4968,7 @@
         </p:nvGrpSpPr>
         <p:grpSpPr>
           <a:xfrm>
-            <a:off x="5553569" y="4130413"/>
+            <a:off x="5553569" y="3845187"/>
             <a:ext cx="3006771" cy="228600"/>
             <a:chOff x="6469053" y="5441268"/>
             <a:chExt cx="3006771" cy="228600"/>
@@ -5425,7 +5356,7 @@
         </p:nvGrpSpPr>
         <p:grpSpPr>
           <a:xfrm>
-            <a:off x="5553569" y="3836931"/>
+            <a:off x="5553569" y="4130546"/>
             <a:ext cx="3006771" cy="228600"/>
             <a:chOff x="6469053" y="5441268"/>
             <a:chExt cx="3006771" cy="228600"/>
@@ -5706,7 +5637,7 @@
         <p:spPr>
           <a:xfrm>
             <a:off x="5037091" y="2795626"/>
-            <a:ext cx="491595" cy="400110"/>
+            <a:ext cx="491595" cy="369332"/>
           </a:xfrm>
           <a:prstGeom prst="rect">
             <a:avLst/>
@@ -5720,7 +5651,7 @@
           <a:lstStyle/>
           <a:p>
             <a:r>
-              <a:rPr lang="en-US" sz="2000" b="1" dirty="0">
+              <a:rPr lang="en-US" b="1" dirty="0">
                 <a:solidFill>
                   <a:srgbClr val="FF0000"/>
                 </a:solidFill>
@@ -5744,7 +5675,7 @@
         </p:nvSpPr>
         <p:spPr>
           <a:xfrm>
-            <a:off x="5057506" y="1818095"/>
+            <a:off x="5064719" y="1818095"/>
             <a:ext cx="436338" cy="369332"/>
           </a:xfrm>
           <a:prstGeom prst="rect">
@@ -5878,8 +5809,8 @@
           </p:nvSpPr>
           <p:spPr>
             <a:xfrm>
-              <a:off x="3475340" y="3562895"/>
-              <a:ext cx="375424" cy="369332"/>
+              <a:off x="3383061" y="3562895"/>
+              <a:ext cx="577402" cy="369332"/>
             </a:xfrm>
             <a:prstGeom prst="rect">
               <a:avLst/>
@@ -5898,12 +5829,256 @@
                     <a:srgbClr val="008000"/>
                   </a:solidFill>
                 </a:rPr>
-                <a:t>IR</a:t>
+                <a:t>MIR</a:t>
               </a:r>
             </a:p>
           </p:txBody>
         </p:sp>
       </p:grpSp>
+      <p:sp>
+        <p:nvSpPr>
+          <p:cNvPr id="2" name="TextBox 1">
+            <a:extLst>
+              <a:ext uri="{FF2B5EF4-FFF2-40B4-BE49-F238E27FC236}">
+                <a16:creationId xmlns:a16="http://schemas.microsoft.com/office/drawing/2014/main" id="{64F8E9F5-58CC-4132-B578-8B84813BBE76}"/>
+              </a:ext>
+            </a:extLst>
+          </p:cNvPr>
+          <p:cNvSpPr txBox="1"/>
+          <p:nvPr/>
+        </p:nvSpPr>
+        <p:spPr>
+          <a:xfrm>
+            <a:off x="8530923" y="3754350"/>
+            <a:ext cx="647934" cy="369332"/>
+          </a:xfrm>
+          <a:prstGeom prst="rect">
+            <a:avLst/>
+          </a:prstGeom>
+          <a:noFill/>
+        </p:spPr>
+        <p:txBody>
+          <a:bodyPr wrap="none" rtlCol="0">
+            <a:spAutoFit/>
+          </a:bodyPr>
+          <a:lstStyle/>
+          <a:p>
+            <a:r>
+              <a:rPr lang="en-US" b="1" dirty="0"/>
+              <a:t>3d</a:t>
+            </a:r>
+            <a:r>
+              <a:rPr lang="en-US" b="1" baseline="-25000" dirty="0"/>
+              <a:t>5/2</a:t>
+            </a:r>
+          </a:p>
+        </p:txBody>
+      </p:sp>
+      <p:sp>
+        <p:nvSpPr>
+          <p:cNvPr id="3" name="TextBox 2">
+            <a:extLst>
+              <a:ext uri="{FF2B5EF4-FFF2-40B4-BE49-F238E27FC236}">
+                <a16:creationId xmlns:a16="http://schemas.microsoft.com/office/drawing/2014/main" id="{18168440-6557-4D7B-BFE2-4457A955A3EF}"/>
+              </a:ext>
+            </a:extLst>
+          </p:cNvPr>
+          <p:cNvSpPr txBox="1"/>
+          <p:nvPr/>
+        </p:nvSpPr>
+        <p:spPr>
+          <a:xfrm>
+            <a:off x="8530923" y="4057302"/>
+            <a:ext cx="647934" cy="369332"/>
+          </a:xfrm>
+          <a:prstGeom prst="rect">
+            <a:avLst/>
+          </a:prstGeom>
+          <a:noFill/>
+        </p:spPr>
+        <p:txBody>
+          <a:bodyPr wrap="none" rtlCol="0">
+            <a:spAutoFit/>
+          </a:bodyPr>
+          <a:lstStyle/>
+          <a:p>
+            <a:r>
+              <a:rPr lang="en-US" b="1" dirty="0"/>
+              <a:t>3d</a:t>
+            </a:r>
+            <a:r>
+              <a:rPr lang="en-US" b="1" baseline="-25000" dirty="0"/>
+              <a:t>3/2</a:t>
+            </a:r>
+          </a:p>
+        </p:txBody>
+      </p:sp>
+      <p:cxnSp>
+        <p:nvCxnSpPr>
+          <p:cNvPr id="7" name="Straight Connector 6">
+            <a:extLst>
+              <a:ext uri="{FF2B5EF4-FFF2-40B4-BE49-F238E27FC236}">
+                <a16:creationId xmlns:a16="http://schemas.microsoft.com/office/drawing/2014/main" id="{5D91C032-29C9-45E6-BD10-A7EC0293B05E}"/>
+              </a:ext>
+            </a:extLst>
+          </p:cNvPr>
+          <p:cNvCxnSpPr>
+            <a:cxnSpLocks/>
+          </p:cNvCxnSpPr>
+          <p:nvPr/>
+        </p:nvCxnSpPr>
+        <p:spPr>
+          <a:xfrm>
+            <a:off x="5640120" y="2582743"/>
+            <a:ext cx="2125644" cy="0"/>
+          </a:xfrm>
+          <a:prstGeom prst="line">
+            <a:avLst/>
+          </a:prstGeom>
+          <a:ln w="38100">
+            <a:solidFill>
+              <a:schemeClr val="tx1"/>
+            </a:solidFill>
+            <a:prstDash val="dash"/>
+          </a:ln>
+        </p:spPr>
+        <p:style>
+          <a:lnRef idx="1">
+            <a:schemeClr val="accent1"/>
+          </a:lnRef>
+          <a:fillRef idx="0">
+            <a:schemeClr val="accent1"/>
+          </a:fillRef>
+          <a:effectRef idx="0">
+            <a:schemeClr val="accent1"/>
+          </a:effectRef>
+          <a:fontRef idx="minor">
+            <a:schemeClr val="tx1"/>
+          </a:fontRef>
+        </p:style>
+      </p:cxnSp>
+      <p:sp>
+        <p:nvSpPr>
+          <p:cNvPr id="71" name="TextBox 70">
+            <a:extLst>
+              <a:ext uri="{FF2B5EF4-FFF2-40B4-BE49-F238E27FC236}">
+                <a16:creationId xmlns:a16="http://schemas.microsoft.com/office/drawing/2014/main" id="{CA3E1B44-C218-4E4D-B988-B90E9532AC86}"/>
+              </a:ext>
+            </a:extLst>
+          </p:cNvPr>
+          <p:cNvSpPr txBox="1"/>
+          <p:nvPr/>
+        </p:nvSpPr>
+        <p:spPr>
+          <a:xfrm>
+            <a:off x="6833652" y="2398077"/>
+            <a:ext cx="579663" cy="369332"/>
+          </a:xfrm>
+          <a:prstGeom prst="rect">
+            <a:avLst/>
+          </a:prstGeom>
+          <a:solidFill>
+            <a:schemeClr val="bg1"/>
+          </a:solidFill>
+        </p:spPr>
+        <p:txBody>
+          <a:bodyPr wrap="square" rtlCol="0">
+            <a:spAutoFit/>
+          </a:bodyPr>
+          <a:lstStyle/>
+          <a:p>
+            <a:r>
+              <a:rPr lang="en-US" b="1" dirty="0">
+                <a:solidFill>
+                  <a:srgbClr val="008000"/>
+                </a:solidFill>
+              </a:rPr>
+              <a:t>MIR</a:t>
+            </a:r>
+          </a:p>
+        </p:txBody>
+      </p:sp>
+      <p:sp>
+        <p:nvSpPr>
+          <p:cNvPr id="9" name="TextBox 8">
+            <a:extLst>
+              <a:ext uri="{FF2B5EF4-FFF2-40B4-BE49-F238E27FC236}">
+                <a16:creationId xmlns:a16="http://schemas.microsoft.com/office/drawing/2014/main" id="{BFCAF0A2-B637-43D2-9715-BAEFA1B9357C}"/>
+              </a:ext>
+            </a:extLst>
+          </p:cNvPr>
+          <p:cNvSpPr txBox="1"/>
+          <p:nvPr/>
+        </p:nvSpPr>
+        <p:spPr>
+          <a:xfrm>
+            <a:off x="5099184" y="2387556"/>
+            <a:ext cx="367408" cy="369332"/>
+          </a:xfrm>
+          <a:prstGeom prst="rect">
+            <a:avLst/>
+          </a:prstGeom>
+          <a:noFill/>
+        </p:spPr>
+        <p:txBody>
+          <a:bodyPr wrap="none" rtlCol="0">
+            <a:spAutoFit/>
+          </a:bodyPr>
+          <a:lstStyle/>
+          <a:p>
+            <a:r>
+              <a:rPr lang="en-US" b="1" dirty="0"/>
+              <a:t>E</a:t>
+            </a:r>
+            <a:r>
+              <a:rPr lang="en-US" b="1" baseline="-25000" dirty="0"/>
+              <a:t>F</a:t>
+            </a:r>
+          </a:p>
+        </p:txBody>
+      </p:sp>
+      <p:cxnSp>
+        <p:nvCxnSpPr>
+          <p:cNvPr id="18" name="Straight Arrow Connector 17">
+            <a:extLst>
+              <a:ext uri="{FF2B5EF4-FFF2-40B4-BE49-F238E27FC236}">
+                <a16:creationId xmlns:a16="http://schemas.microsoft.com/office/drawing/2014/main" id="{281FEB61-1AE7-4966-863E-E3CBFA6728D8}"/>
+              </a:ext>
+            </a:extLst>
+          </p:cNvPr>
+          <p:cNvCxnSpPr/>
+          <p:nvPr/>
+        </p:nvCxnSpPr>
+        <p:spPr>
+          <a:xfrm flipV="1">
+            <a:off x="6744231" y="2319949"/>
+            <a:ext cx="0" cy="457200"/>
+          </a:xfrm>
+          <a:prstGeom prst="straightConnector1">
+            <a:avLst/>
+          </a:prstGeom>
+          <a:ln w="38100">
+            <a:solidFill>
+              <a:srgbClr val="008000"/>
+            </a:solidFill>
+            <a:tailEnd type="triangle"/>
+          </a:ln>
+        </p:spPr>
+        <p:style>
+          <a:lnRef idx="1">
+            <a:schemeClr val="accent1"/>
+          </a:lnRef>
+          <a:fillRef idx="0">
+            <a:schemeClr val="accent1"/>
+          </a:fillRef>
+          <a:effectRef idx="0">
+            <a:schemeClr val="accent1"/>
+          </a:effectRef>
+          <a:fontRef idx="minor">
+            <a:schemeClr val="tx1"/>
+          </a:fontRef>
+        </p:style>
+      </p:cxnSp>
     </p:spTree>
     <p:extLst>
       <p:ext uri="{BB962C8B-B14F-4D97-AF65-F5344CB8AC3E}">

</xml_diff>